<commit_message>
changed RxJS and all PPT
</commit_message>
<xml_diff>
--- a/PPT/05- Angular Routing.pptx
+++ b/PPT/05- Angular Routing.pptx
@@ -1900,7 +1900,7 @@
           <a:p>
             <a:fld id="{B496B693-9FDE-D34D-BA2D-87876F5E0558}" type="datetime1">
               <a:rPr lang="en-US" smtClean="0"/>
-              <a:t>1/9/22</a:t>
+              <a:t>1/10/22</a:t>
             </a:fld>
             <a:endParaRPr lang="en-US"/>
           </a:p>
@@ -2059,7 +2059,7 @@
           <a:p>
             <a:fld id="{2C668659-E1B9-F248-8B7A-62E98257FA2B}" type="datetime1">
               <a:rPr lang="en-US" smtClean="0"/>
-              <a:t>1/9/22</a:t>
+              <a:t>1/10/22</a:t>
             </a:fld>
             <a:endParaRPr lang="en-US"/>
           </a:p>
@@ -2537,7 +2537,7 @@
           <a:p>
             <a:fld id="{B6121E9A-9D8F-554C-B283-F41E0A321D9E}" type="datetime1">
               <a:rPr lang="en-US" smtClean="0"/>
-              <a:t>1/9/22</a:t>
+              <a:t>1/10/22</a:t>
             </a:fld>
             <a:endParaRPr lang="en-US"/>
           </a:p>
@@ -2662,7 +2662,7 @@
           <a:p>
             <a:fld id="{4830FFAC-C408-5B4A-A43B-C51D21E865D6}" type="datetime1">
               <a:rPr lang="en-US" smtClean="0"/>
-              <a:t>1/9/22</a:t>
+              <a:t>1/10/22</a:t>
             </a:fld>
             <a:endParaRPr lang="en-US"/>
           </a:p>
@@ -2758,7 +2758,7 @@
           <a:p>
             <a:fld id="{AAFBA3EB-6224-474F-84CA-5E91E4443D27}" type="datetime1">
               <a:rPr lang="en-US" smtClean="0"/>
-              <a:t>1/9/22</a:t>
+              <a:t>1/10/22</a:t>
             </a:fld>
             <a:endParaRPr lang="en-US"/>
           </a:p>
@@ -2992,7 +2992,7 @@
           <a:p>
             <a:fld id="{5A1FA41D-3A39-F741-AA79-3F454EC99F26}" type="datetime1">
               <a:rPr lang="en-US" smtClean="0"/>
-              <a:t>1/9/22</a:t>
+              <a:t>1/10/22</a:t>
             </a:fld>
             <a:endParaRPr lang="en-US"/>
           </a:p>
@@ -30883,7 +30883,21 @@
                 <a:latin typeface="Consolas" panose="020B0609020204030204" pitchFamily="49" charset="0"/>
                 <a:cs typeface="Consolas" panose="020B0609020204030204" pitchFamily="49" charset="0"/>
               </a:rPr>
-              <a:t>      name: 'filter’</a:t>
+              <a:t>      name: ‘</a:t>
+            </a:r>
+            <a:r>
+              <a:rPr lang="en-US" sz="1400" dirty="0" err="1">
+                <a:latin typeface="Consolas" panose="020B0609020204030204" pitchFamily="49" charset="0"/>
+                <a:cs typeface="Consolas" panose="020B0609020204030204" pitchFamily="49" charset="0"/>
+              </a:rPr>
+              <a:t>Myfilter</a:t>
+            </a:r>
+            <a:r>
+              <a:rPr lang="en-US" sz="1400" dirty="0">
+                <a:latin typeface="Consolas" panose="020B0609020204030204" pitchFamily="49" charset="0"/>
+                <a:cs typeface="Consolas" panose="020B0609020204030204" pitchFamily="49" charset="0"/>
+              </a:rPr>
+              <a:t>’</a:t>
             </a:r>
           </a:p>
           <a:p>
@@ -31067,7 +31081,24 @@
                 <a:latin typeface="Consolas" panose="020B0609020204030204" pitchFamily="49" charset="0"/>
                 <a:cs typeface="Consolas" panose="020B0609020204030204" pitchFamily="49" charset="0"/>
               </a:rPr>
-              <a:t>   return value;</a:t>
+              <a:t>   return </a:t>
+            </a:r>
+            <a:r>
+              <a:rPr lang="en-US" sz="1400" b="1" dirty="0" err="1">
+                <a:solidFill>
+                  <a:srgbClr val="C00000"/>
+                </a:solidFill>
+                <a:latin typeface="Consolas" panose="020B0609020204030204" pitchFamily="49" charset="0"/>
+                <a:cs typeface="Consolas" panose="020B0609020204030204" pitchFamily="49" charset="0"/>
+              </a:rPr>
+              <a:t>listItems</a:t>
+            </a:r>
+            <a:r>
+              <a:rPr lang="en-US" sz="1400" dirty="0">
+                <a:latin typeface="Consolas" panose="020B0609020204030204" pitchFamily="49" charset="0"/>
+                <a:cs typeface="Consolas" panose="020B0609020204030204" pitchFamily="49" charset="0"/>
+              </a:rPr>
+              <a:t>;</a:t>
             </a:r>
           </a:p>
           <a:p>
@@ -31100,14 +31131,14 @@
               <a:t>if (</a:t>
             </a:r>
             <a:r>
-              <a:rPr lang="en-US" sz="1400" b="1" dirty="0">
+              <a:rPr lang="en-US" sz="1400" b="1" dirty="0" err="1">
                 <a:solidFill>
                   <a:srgbClr val="C00000"/>
                 </a:solidFill>
                 <a:latin typeface="Consolas" panose="020B0609020204030204" pitchFamily="49" charset="0"/>
                 <a:cs typeface="Consolas" panose="020B0609020204030204" pitchFamily="49" charset="0"/>
               </a:rPr>
-              <a:t>value</a:t>
+              <a:t>listItems</a:t>
             </a:r>
             <a:r>
               <a:rPr lang="en-US" sz="1400" dirty="0">
@@ -31572,7 +31603,7 @@
                 <a:latin typeface="Consolas" panose="020B0609020204030204" pitchFamily="49" charset="0"/>
                 <a:cs typeface="Consolas" panose="020B0609020204030204" pitchFamily="49" charset="0"/>
               </a:rPr>
-              <a:t>filter:filterCity</a:t>
+              <a:t>Myfilter:filterCity</a:t>
             </a:r>
             <a:r>
               <a:rPr lang="en-US" sz="1600" dirty="0">

</xml_diff>

<commit_message>
typeahead also in RxJs Advanced
</commit_message>
<xml_diff>
--- a/PPT/05- Angular Routing.pptx
+++ b/PPT/05- Angular Routing.pptx
@@ -1900,7 +1900,7 @@
           <a:p>
             <a:fld id="{B496B693-9FDE-D34D-BA2D-87876F5E0558}" type="datetime1">
               <a:rPr lang="en-US" smtClean="0"/>
-              <a:t>1/10/22</a:t>
+              <a:t>1/22/22</a:t>
             </a:fld>
             <a:endParaRPr lang="en-US"/>
           </a:p>
@@ -2059,7 +2059,7 @@
           <a:p>
             <a:fld id="{2C668659-E1B9-F248-8B7A-62E98257FA2B}" type="datetime1">
               <a:rPr lang="en-US" smtClean="0"/>
-              <a:t>1/10/22</a:t>
+              <a:t>1/22/22</a:t>
             </a:fld>
             <a:endParaRPr lang="en-US"/>
           </a:p>
@@ -2537,7 +2537,7 @@
           <a:p>
             <a:fld id="{B6121E9A-9D8F-554C-B283-F41E0A321D9E}" type="datetime1">
               <a:rPr lang="en-US" smtClean="0"/>
-              <a:t>1/10/22</a:t>
+              <a:t>1/22/22</a:t>
             </a:fld>
             <a:endParaRPr lang="en-US"/>
           </a:p>
@@ -2662,7 +2662,7 @@
           <a:p>
             <a:fld id="{4830FFAC-C408-5B4A-A43B-C51D21E865D6}" type="datetime1">
               <a:rPr lang="en-US" smtClean="0"/>
-              <a:t>1/10/22</a:t>
+              <a:t>1/22/22</a:t>
             </a:fld>
             <a:endParaRPr lang="en-US"/>
           </a:p>
@@ -2758,7 +2758,7 @@
           <a:p>
             <a:fld id="{AAFBA3EB-6224-474F-84CA-5E91E4443D27}" type="datetime1">
               <a:rPr lang="en-US" smtClean="0"/>
-              <a:t>1/10/22</a:t>
+              <a:t>1/22/22</a:t>
             </a:fld>
             <a:endParaRPr lang="en-US"/>
           </a:p>
@@ -2992,7 +2992,7 @@
           <a:p>
             <a:fld id="{5A1FA41D-3A39-F741-AA79-3F454EC99F26}" type="datetime1">
               <a:rPr lang="en-US" smtClean="0"/>
-              <a:t>1/10/22</a:t>
+              <a:t>1/22/22</a:t>
             </a:fld>
             <a:endParaRPr lang="en-US"/>
           </a:p>
@@ -30485,7 +30485,24 @@
                 <a:latin typeface="Consolas" panose="020B0609020204030204" pitchFamily="49" charset="0"/>
                 <a:cs typeface="Consolas" panose="020B0609020204030204" pitchFamily="49" charset="0"/>
               </a:rPr>
-              <a:t>     name: 'filter’</a:t>
+              <a:t>     name: ‘</a:t>
+            </a:r>
+            <a:r>
+              <a:rPr lang="en-US" dirty="0" err="1">
+                <a:solidFill>
+                  <a:srgbClr val="FF0000"/>
+                </a:solidFill>
+                <a:latin typeface="Consolas" panose="020B0609020204030204" pitchFamily="49" charset="0"/>
+                <a:cs typeface="Consolas" panose="020B0609020204030204" pitchFamily="49" charset="0"/>
+              </a:rPr>
+              <a:t>myfilter</a:t>
+            </a:r>
+            <a:r>
+              <a:rPr lang="en-US" dirty="0">
+                <a:latin typeface="Consolas" panose="020B0609020204030204" pitchFamily="49" charset="0"/>
+                <a:cs typeface="Consolas" panose="020B0609020204030204" pitchFamily="49" charset="0"/>
+              </a:rPr>
+              <a:t>’</a:t>
             </a:r>
           </a:p>
           <a:p>
@@ -30886,11 +30903,11 @@
               <a:t>      name: ‘</a:t>
             </a:r>
             <a:r>
-              <a:rPr lang="en-US" sz="1400" dirty="0" err="1">
+              <a:rPr lang="en-US" sz="1400" b="1" dirty="0" err="1">
                 <a:latin typeface="Consolas" panose="020B0609020204030204" pitchFamily="49" charset="0"/>
                 <a:cs typeface="Consolas" panose="020B0609020204030204" pitchFamily="49" charset="0"/>
               </a:rPr>
-              <a:t>Myfilter</a:t>
+              <a:t>myfilter</a:t>
             </a:r>
             <a:r>
               <a:rPr lang="en-US" sz="1400" dirty="0">
@@ -31013,7 +31030,7 @@
                 <a:latin typeface="Consolas" panose="020B0609020204030204" pitchFamily="49" charset="0"/>
                 <a:cs typeface="Consolas" panose="020B0609020204030204" pitchFamily="49" charset="0"/>
               </a:rPr>
-              <a:t>listItems</a:t>
+              <a:t>listOfItems</a:t>
             </a:r>
             <a:r>
               <a:rPr lang="en-US" sz="1400" dirty="0">
@@ -31023,14 +31040,24 @@
               <a:t>: any[], </a:t>
             </a:r>
             <a:r>
-              <a:rPr lang="en-US" sz="1400" b="1" dirty="0" err="1">
-                <a:solidFill>
-                  <a:srgbClr val="C00000"/>
+              <a:rPr lang="en-US" sz="1400" dirty="0" err="1">
+                <a:solidFill>
+                  <a:srgbClr val="FF0000"/>
                 </a:solidFill>
                 <a:latin typeface="Consolas" panose="020B0609020204030204" pitchFamily="49" charset="0"/>
                 <a:cs typeface="Consolas" panose="020B0609020204030204" pitchFamily="49" charset="0"/>
               </a:rPr>
-              <a:t>args</a:t>
+              <a:t>search</a:t>
+            </a:r>
+            <a:r>
+              <a:rPr lang="en-US" sz="1400" b="1" dirty="0" err="1">
+                <a:solidFill>
+                  <a:srgbClr val="FF0000"/>
+                </a:solidFill>
+                <a:latin typeface="Consolas" panose="020B0609020204030204" pitchFamily="49" charset="0"/>
+                <a:cs typeface="Consolas" panose="020B0609020204030204" pitchFamily="49" charset="0"/>
+              </a:rPr>
+              <a:t>arg</a:t>
             </a:r>
             <a:r>
               <a:rPr lang="en-US" sz="1400" dirty="0">
@@ -31057,14 +31084,24 @@
               <a:t>if (!</a:t>
             </a:r>
             <a:r>
-              <a:rPr lang="en-US" sz="1400" b="1" dirty="0" err="1">
-                <a:solidFill>
-                  <a:srgbClr val="C00000"/>
+              <a:rPr lang="en-US" sz="1400" dirty="0" err="1">
+                <a:solidFill>
+                  <a:srgbClr val="FF0000"/>
                 </a:solidFill>
                 <a:latin typeface="Consolas" panose="020B0609020204030204" pitchFamily="49" charset="0"/>
                 <a:cs typeface="Consolas" panose="020B0609020204030204" pitchFamily="49" charset="0"/>
               </a:rPr>
-              <a:t>args</a:t>
+              <a:t>search</a:t>
+            </a:r>
+            <a:r>
+              <a:rPr lang="en-US" sz="1400" b="1" dirty="0" err="1">
+                <a:solidFill>
+                  <a:srgbClr val="FF0000"/>
+                </a:solidFill>
+                <a:latin typeface="Consolas" panose="020B0609020204030204" pitchFamily="49" charset="0"/>
+                <a:cs typeface="Consolas" panose="020B0609020204030204" pitchFamily="49" charset="0"/>
+              </a:rPr>
+              <a:t>arg</a:t>
             </a:r>
             <a:r>
               <a:rPr lang="en-US" sz="1400" dirty="0">
@@ -31091,7 +31128,7 @@
                 <a:latin typeface="Consolas" panose="020B0609020204030204" pitchFamily="49" charset="0"/>
                 <a:cs typeface="Consolas" panose="020B0609020204030204" pitchFamily="49" charset="0"/>
               </a:rPr>
-              <a:t>listItems</a:t>
+              <a:t>listOfItems</a:t>
             </a:r>
             <a:r>
               <a:rPr lang="en-US" sz="1400" dirty="0">
@@ -31172,14 +31209,24 @@
               <a:t> = </a:t>
             </a:r>
             <a:r>
-              <a:rPr lang="en-US" sz="1400" b="1" dirty="0" err="1">
+              <a:rPr lang="en-US" sz="1400" dirty="0" err="1">
                 <a:solidFill>
                   <a:srgbClr val="FF0000"/>
                 </a:solidFill>
                 <a:latin typeface="Consolas" panose="020B0609020204030204" pitchFamily="49" charset="0"/>
                 <a:cs typeface="Consolas" panose="020B0609020204030204" pitchFamily="49" charset="0"/>
               </a:rPr>
-              <a:t>args</a:t>
+              <a:t>search</a:t>
+            </a:r>
+            <a:r>
+              <a:rPr lang="en-US" sz="1400" b="1" dirty="0" err="1">
+                <a:solidFill>
+                  <a:srgbClr val="FF0000"/>
+                </a:solidFill>
+                <a:latin typeface="Consolas" panose="020B0609020204030204" pitchFamily="49" charset="0"/>
+                <a:cs typeface="Consolas" panose="020B0609020204030204" pitchFamily="49" charset="0"/>
+              </a:rPr>
+              <a:t>arg</a:t>
             </a:r>
             <a:r>
               <a:rPr lang="en-US" sz="1400" b="1" dirty="0">
@@ -31525,6 +31572,9 @@
             </a:r>
             <a:r>
               <a:rPr lang="en-US" sz="1600" b="1" dirty="0" err="1">
+                <a:solidFill>
+                  <a:srgbClr val="FF0000"/>
+                </a:solidFill>
                 <a:latin typeface="Consolas" panose="020B0609020204030204" pitchFamily="49" charset="0"/>
                 <a:cs typeface="Consolas" panose="020B0609020204030204" pitchFamily="49" charset="0"/>
               </a:rPr>
@@ -31603,7 +31653,17 @@
                 <a:latin typeface="Consolas" panose="020B0609020204030204" pitchFamily="49" charset="0"/>
                 <a:cs typeface="Consolas" panose="020B0609020204030204" pitchFamily="49" charset="0"/>
               </a:rPr>
-              <a:t>Myfilter:filterCity</a:t>
+              <a:t>myfilter:</a:t>
+            </a:r>
+            <a:r>
+              <a:rPr lang="en-US" sz="1600" b="1" dirty="0" err="1">
+                <a:solidFill>
+                  <a:srgbClr val="FF0000"/>
+                </a:solidFill>
+                <a:latin typeface="Consolas" panose="020B0609020204030204" pitchFamily="49" charset="0"/>
+                <a:cs typeface="Consolas" panose="020B0609020204030204" pitchFamily="49" charset="0"/>
+              </a:rPr>
+              <a:t>filterCity</a:t>
             </a:r>
             <a:r>
               <a:rPr lang="en-US" sz="1600" dirty="0">

</xml_diff>